<commit_message>
Implemented FGSM Attack/Model Interpretability
</commit_message>
<xml_diff>
--- a/docs/ProjectOverview.pptx
+++ b/docs/ProjectOverview.pptx
@@ -7,6 +7,7 @@
   <p:sldIdLst>
     <p:sldId id="256" r:id="rId2"/>
     <p:sldId id="257" r:id="rId3"/>
+    <p:sldId id="258" r:id="rId4"/>
   </p:sldIdLst>
   <p:sldSz cx="9144000" cy="6858000" type="screen4x3"/>
   <p:notesSz cx="6858000" cy="9144000"/>
@@ -2909,7 +2910,7 @@
           <a:p>
             <a:fld id="{7F49D355-16BD-4E45-BD9A-5EA878CF7CBD}" type="datetimeFigureOut">
               <a:rPr lang="it-IT" smtClean="0"/>
-              <a:t>09/07/2020</a:t>
+              <a:t>14/07/2020</a:t>
             </a:fld>
             <a:endParaRPr lang="it-IT"/>
           </a:p>
@@ -3422,7 +3423,7 @@
           <a:p>
             <a:fld id="{7F49D355-16BD-4E45-BD9A-5EA878CF7CBD}" type="datetimeFigureOut">
               <a:rPr lang="it-IT" smtClean="0"/>
-              <a:t>09/07/2020</a:t>
+              <a:t>14/07/2020</a:t>
             </a:fld>
             <a:endParaRPr lang="it-IT"/>
           </a:p>
@@ -3597,7 +3598,7 @@
           <a:p>
             <a:fld id="{7F49D355-16BD-4E45-BD9A-5EA878CF7CBD}" type="datetimeFigureOut">
               <a:rPr lang="it-IT" smtClean="0"/>
-              <a:t>09/07/2020</a:t>
+              <a:t>14/07/2020</a:t>
             </a:fld>
             <a:endParaRPr lang="it-IT"/>
           </a:p>
@@ -3762,7 +3763,7 @@
           <a:p>
             <a:fld id="{7F49D355-16BD-4E45-BD9A-5EA878CF7CBD}" type="datetimeFigureOut">
               <a:rPr lang="it-IT" smtClean="0"/>
-              <a:t>09/07/2020</a:t>
+              <a:t>14/07/2020</a:t>
             </a:fld>
             <a:endParaRPr lang="it-IT"/>
           </a:p>
@@ -6886,7 +6887,7 @@
           <a:p>
             <a:fld id="{7F49D355-16BD-4E45-BD9A-5EA878CF7CBD}" type="datetimeFigureOut">
               <a:rPr lang="it-IT" smtClean="0"/>
-              <a:t>09/07/2020</a:t>
+              <a:t>14/07/2020</a:t>
             </a:fld>
             <a:endParaRPr lang="it-IT"/>
           </a:p>
@@ -7169,7 +7170,7 @@
           <a:p>
             <a:fld id="{7F49D355-16BD-4E45-BD9A-5EA878CF7CBD}" type="datetimeFigureOut">
               <a:rPr lang="it-IT" smtClean="0"/>
-              <a:t>09/07/2020</a:t>
+              <a:t>14/07/2020</a:t>
             </a:fld>
             <a:endParaRPr lang="it-IT"/>
           </a:p>
@@ -7586,7 +7587,7 @@
           <a:p>
             <a:fld id="{7F49D355-16BD-4E45-BD9A-5EA878CF7CBD}" type="datetimeFigureOut">
               <a:rPr lang="it-IT" smtClean="0"/>
-              <a:t>09/07/2020</a:t>
+              <a:t>14/07/2020</a:t>
             </a:fld>
             <a:endParaRPr lang="it-IT"/>
           </a:p>
@@ -7699,7 +7700,7 @@
           <a:p>
             <a:fld id="{7F49D355-16BD-4E45-BD9A-5EA878CF7CBD}" type="datetimeFigureOut">
               <a:rPr lang="it-IT" smtClean="0"/>
-              <a:t>09/07/2020</a:t>
+              <a:t>14/07/2020</a:t>
             </a:fld>
             <a:endParaRPr lang="it-IT"/>
           </a:p>
@@ -7789,7 +7790,7 @@
           <a:p>
             <a:fld id="{7F49D355-16BD-4E45-BD9A-5EA878CF7CBD}" type="datetimeFigureOut">
               <a:rPr lang="it-IT" smtClean="0"/>
-              <a:t>09/07/2020</a:t>
+              <a:t>14/07/2020</a:t>
             </a:fld>
             <a:endParaRPr lang="it-IT"/>
           </a:p>
@@ -7964,7 +7965,7 @@
           <a:p>
             <a:fld id="{7F49D355-16BD-4E45-BD9A-5EA878CF7CBD}" type="datetimeFigureOut">
               <a:rPr lang="it-IT" smtClean="0"/>
-              <a:t>09/07/2020</a:t>
+              <a:t>14/07/2020</a:t>
             </a:fld>
             <a:endParaRPr lang="it-IT"/>
           </a:p>
@@ -8450,7 +8451,7 @@
           <a:p>
             <a:fld id="{7F49D355-16BD-4E45-BD9A-5EA878CF7CBD}" type="datetimeFigureOut">
               <a:rPr lang="it-IT" smtClean="0"/>
-              <a:t>09/07/2020</a:t>
+              <a:t>14/07/2020</a:t>
             </a:fld>
             <a:endParaRPr lang="it-IT"/>
           </a:p>
@@ -9002,7 +9003,7 @@
           <a:p>
             <a:fld id="{7F49D355-16BD-4E45-BD9A-5EA878CF7CBD}" type="datetimeFigureOut">
               <a:rPr lang="it-IT" smtClean="0"/>
-              <a:t>09/07/2020</a:t>
+              <a:t>14/07/2020</a:t>
             </a:fld>
             <a:endParaRPr lang="it-IT"/>
           </a:p>
@@ -9855,6 +9856,141 @@
 </p:sld>
 </file>
 
+<file path=ppt/slides/slide3.xml><?xml version="1.0" encoding="utf-8"?>
+<p:sld xmlns:a="http://schemas.openxmlformats.org/drawingml/2006/main" xmlns:r="http://schemas.openxmlformats.org/officeDocument/2006/relationships" xmlns:p="http://schemas.openxmlformats.org/presentationml/2006/main">
+  <p:cSld>
+    <p:spTree>
+      <p:nvGrpSpPr>
+        <p:cNvPr id="1" name=""/>
+        <p:cNvGrpSpPr/>
+        <p:nvPr/>
+      </p:nvGrpSpPr>
+      <p:grpSpPr>
+        <a:xfrm>
+          <a:off x="0" y="0"/>
+          <a:ext cx="0" cy="0"/>
+          <a:chOff x="0" y="0"/>
+          <a:chExt cx="0" cy="0"/>
+        </a:xfrm>
+      </p:grpSpPr>
+      <p:sp>
+        <p:nvSpPr>
+          <p:cNvPr id="2" name="Titolo 1"/>
+          <p:cNvSpPr>
+            <a:spLocks noGrp="1"/>
+          </p:cNvSpPr>
+          <p:nvPr>
+            <p:ph type="title"/>
+          </p:nvPr>
+        </p:nvSpPr>
+        <p:spPr/>
+        <p:txBody>
+          <a:bodyPr/>
+          <a:lstStyle/>
+          <a:p>
+            <a:r>
+              <a:rPr lang="it-IT" dirty="0" smtClean="0"/>
+              <a:t>Informazioni Preliminari</a:t>
+            </a:r>
+            <a:endParaRPr lang="it-IT" dirty="0"/>
+          </a:p>
+        </p:txBody>
+      </p:sp>
+      <p:sp>
+        <p:nvSpPr>
+          <p:cNvPr id="3" name="Segnaposto contenuto 2"/>
+          <p:cNvSpPr>
+            <a:spLocks noGrp="1"/>
+          </p:cNvSpPr>
+          <p:nvPr>
+            <p:ph idx="1"/>
+          </p:nvPr>
+        </p:nvSpPr>
+        <p:spPr/>
+        <p:txBody>
+          <a:bodyPr/>
+          <a:lstStyle/>
+          <a:p>
+            <a:r>
+              <a:rPr lang="it-IT" dirty="0" smtClean="0"/>
+              <a:t>Nei seguenti esperimenti è stato usato un subset del </a:t>
+            </a:r>
+            <a:r>
+              <a:rPr lang="it-IT" dirty="0" err="1" smtClean="0"/>
+              <a:t>dataset</a:t>
+            </a:r>
+            <a:r>
+              <a:rPr lang="it-IT" dirty="0" smtClean="0"/>
+              <a:t> fornito. Sono state utilizzate solo immagini relativa alla vista ‘PA’ costituito da 303 campioni.</a:t>
+            </a:r>
+          </a:p>
+          <a:p>
+            <a:r>
+              <a:rPr lang="it-IT" dirty="0" smtClean="0"/>
+              <a:t>Negli esperimenti realizzati sono stati realizzati a partire dal subset di immagini i relativi </a:t>
+            </a:r>
+            <a:r>
+              <a:rPr lang="it-IT" dirty="0" err="1" smtClean="0"/>
+              <a:t>dataset</a:t>
+            </a:r>
+            <a:r>
+              <a:rPr lang="it-IT" dirty="0" smtClean="0"/>
+              <a:t> di </a:t>
+            </a:r>
+            <a:r>
+              <a:rPr lang="it-IT" dirty="0" err="1" smtClean="0"/>
+              <a:t>train</a:t>
+            </a:r>
+            <a:r>
+              <a:rPr lang="it-IT" dirty="0" smtClean="0"/>
+              <a:t>, </a:t>
+            </a:r>
+            <a:r>
+              <a:rPr lang="it-IT" dirty="0" err="1" smtClean="0"/>
+              <a:t>validation</a:t>
+            </a:r>
+            <a:r>
+              <a:rPr lang="it-IT" dirty="0" smtClean="0"/>
+              <a:t> e test.</a:t>
+            </a:r>
+          </a:p>
+          <a:p>
+            <a:r>
+              <a:rPr lang="it-IT" dirty="0" smtClean="0"/>
+              <a:t>È stata utilizzata la seguente suddivisione : Train set 70% , </a:t>
+            </a:r>
+            <a:r>
+              <a:rPr lang="it-IT" dirty="0" err="1" smtClean="0"/>
+              <a:t>Validation</a:t>
+            </a:r>
+            <a:r>
+              <a:rPr lang="it-IT" dirty="0" smtClean="0"/>
+              <a:t> set 15%, Test set 15% </a:t>
+            </a:r>
+            <a:r>
+              <a:rPr lang="it-IT" sz="1200" dirty="0" smtClean="0"/>
+              <a:t>(percentuali relative ai 303 campioni presi in esame)</a:t>
+            </a:r>
+            <a:endParaRPr lang="it-IT" sz="1200" dirty="0"/>
+          </a:p>
+          <a:p>
+            <a:endParaRPr lang="it-IT" dirty="0" smtClean="0"/>
+          </a:p>
+        </p:txBody>
+      </p:sp>
+    </p:spTree>
+    <p:extLst>
+      <p:ext uri="{BB962C8B-B14F-4D97-AF65-F5344CB8AC3E}">
+        <p14:creationId xmlns:p14="http://schemas.microsoft.com/office/powerpoint/2010/main" val="4156179914"/>
+      </p:ext>
+    </p:extLst>
+  </p:cSld>
+  <p:clrMapOvr>
+    <a:masterClrMapping/>
+  </p:clrMapOvr>
+</p:sld>
+</file>
+
 <file path=ppt/theme/theme1.xml><?xml version="1.0" encoding="utf-8"?>
 <a:theme xmlns:a="http://schemas.openxmlformats.org/drawingml/2006/main" name="Intreccio">
   <a:themeElements>

</xml_diff>